<commit_message>
Renamed 'Entity Framework 7' to 'Entity Framework Core 1.0' in PPTXs
</commit_message>
<xml_diff>
--- a/Presentation/07-Conclusion/Conclusion.pptx
+++ b/Presentation/07-Conclusion/Conclusion.pptx
@@ -32687,7 +32687,7 @@
           <a:graphicData uri="http://schemas.openxmlformats.org/presentationml/2006/ole">
             <mc:AlternateContent xmlns:mc="http://schemas.openxmlformats.org/markup-compatibility/2006">
               <mc:Choice xmlns:v="urn:schemas-microsoft-com:vml" Requires="v">
-                <p:oleObj spid="_x0000_s3084" name="think-cell Slide" r:id="rId5" imgW="270" imgH="270" progId="TCLayout.ActiveDocument.1">
+                <p:oleObj spid="_x0000_s3085" name="think-cell Slide" r:id="rId5" imgW="270" imgH="270" progId="TCLayout.ActiveDocument.1">
                   <p:embed/>
                 </p:oleObj>
               </mc:Choice>
@@ -35890,7 +35890,7 @@
           <a:graphicData uri="http://schemas.openxmlformats.org/presentationml/2006/ole">
             <mc:AlternateContent xmlns:mc="http://schemas.openxmlformats.org/markup-compatibility/2006">
               <mc:Choice xmlns:v="urn:schemas-microsoft-com:vml" Requires="v">
-                <p:oleObj spid="_x0000_s1036" name="think-cell Slide" r:id="rId5" imgW="270" imgH="270" progId="TCLayout.ActiveDocument.1">
+                <p:oleObj spid="_x0000_s1037" name="think-cell Slide" r:id="rId5" imgW="270" imgH="270" progId="TCLayout.ActiveDocument.1">
                   <p:embed/>
                 </p:oleObj>
               </mc:Choice>
@@ -42797,7 +42797,7 @@
           <a:graphicData uri="http://schemas.openxmlformats.org/presentationml/2006/ole">
             <mc:AlternateContent xmlns:mc="http://schemas.openxmlformats.org/markup-compatibility/2006">
               <mc:Choice xmlns:v="urn:schemas-microsoft-com:vml" Requires="v">
-                <p:oleObj spid="_x0000_s2060" name="think-cell Slide" r:id="rId5" imgW="270" imgH="270" progId="TCLayout.ActiveDocument.1">
+                <p:oleObj spid="_x0000_s2061" name="think-cell Slide" r:id="rId5" imgW="270" imgH="270" progId="TCLayout.ActiveDocument.1">
                   <p:embed/>
                 </p:oleObj>
               </mc:Choice>

</xml_diff>